<commit_message>
Corrected slide 15 dict output
</commit_message>
<xml_diff>
--- a/python-intro/slides/11_ceda-sets__dicts.pptx
+++ b/python-intro/slides/11_ceda-sets__dicts.pptx
@@ -268,7 +268,7 @@
               <a:pPr>
                 <a:defRPr/>
               </a:pPr>
-              <a:t>18/11/2021</a:t>
+              <a:t>16/02/2023</a:t>
             </a:fld>
             <a:endParaRPr lang="en-GB"/>
           </a:p>
@@ -6337,7 +6337,7 @@
               <a:pPr>
                 <a:defRPr/>
               </a:pPr>
-              <a:t>18/11/2021</a:t>
+              <a:t>16/02/2023</a:t>
             </a:fld>
             <a:endParaRPr lang="en-GB"/>
           </a:p>
@@ -6574,7 +6574,7 @@
               <a:pPr>
                 <a:defRPr/>
               </a:pPr>
-              <a:t>18/11/2021</a:t>
+              <a:t>16/02/2023</a:t>
             </a:fld>
             <a:endParaRPr lang="en-GB"/>
           </a:p>
@@ -7220,7 +7220,7 @@
               <a:pPr>
                 <a:defRPr/>
               </a:pPr>
-              <a:t>18/11/2021</a:t>
+              <a:t>16/02/2023</a:t>
             </a:fld>
             <a:endParaRPr lang="en-GB"/>
           </a:p>
@@ -8433,13 +8433,6 @@
   <p:clrMapOvr>
     <a:masterClrMapping/>
   </p:clrMapOvr>
-  <p:timing>
-    <p:tnLst>
-      <p:par>
-        <p:cTn id="1" dur="indefinite" restart="never" nodeType="tmRoot"/>
-      </p:par>
-    </p:tnLst>
-  </p:timing>
 </p:sld>
 </file>
 
@@ -8627,13 +8620,6 @@
               </a:rPr>
               <a:t>{3}</a:t>
             </a:r>
-            <a:r>
-              <a:rPr lang="en-GB" sz="2400" dirty="0">
-                <a:latin typeface="Courier New" panose="02070309020205020404" pitchFamily="49" charset="0"/>
-                <a:cs typeface="Courier New" panose="02070309020205020404" pitchFamily="49" charset="0"/>
-              </a:rPr>
-              <a:t/>
-            </a:r>
             <a:br>
               <a:rPr lang="en-GB" sz="2400" dirty="0">
                 <a:latin typeface="Courier New" panose="02070309020205020404" pitchFamily="49" charset="0"/>
@@ -8670,13 +8656,6 @@
                 <a:cs typeface="Courier New" panose="02070309020205020404" pitchFamily="49" charset="0"/>
               </a:rPr>
               <a:t>{2}</a:t>
-            </a:r>
-            <a:r>
-              <a:rPr lang="en-GB" sz="2400" dirty="0">
-                <a:latin typeface="Courier New" panose="02070309020205020404" pitchFamily="49" charset="0"/>
-                <a:cs typeface="Courier New" panose="02070309020205020404" pitchFamily="49" charset="0"/>
-              </a:rPr>
-              <a:t/>
             </a:r>
             <a:br>
               <a:rPr lang="en-GB" sz="2400" dirty="0">
@@ -8939,13 +8918,6 @@
     <a:masterClrMapping/>
   </p:clrMapOvr>
   <p:transition spd="slow"/>
-  <p:timing>
-    <p:tnLst>
-      <p:par>
-        <p:cTn id="1" dur="indefinite" restart="never" nodeType="tmRoot"/>
-      </p:par>
-    </p:tnLst>
-  </p:timing>
 </p:sld>
 </file>
 
@@ -9134,13 +9106,6 @@
               </a:rPr>
               <a:t>{2}</a:t>
             </a:r>
-            <a:r>
-              <a:rPr lang="en-GB" sz="2200" dirty="0">
-                <a:latin typeface="Courier New" panose="02070309020205020404" pitchFamily="49" charset="0"/>
-                <a:cs typeface="Courier New" panose="02070309020205020404" pitchFamily="49" charset="0"/>
-              </a:rPr>
-              <a:t/>
-            </a:r>
             <a:br>
               <a:rPr lang="en-GB" sz="2200" dirty="0">
                 <a:latin typeface="Courier New" panose="02070309020205020404" pitchFamily="49" charset="0"/>
@@ -9389,13 +9354,6 @@
     <a:masterClrMapping/>
   </p:clrMapOvr>
   <p:transition spd="slow"/>
-  <p:timing>
-    <p:tnLst>
-      <p:par>
-        <p:cTn id="1" dur="indefinite" restart="never" nodeType="tmRoot"/>
-      </p:par>
-    </p:tnLst>
-  </p:timing>
 </p:sld>
 </file>
 
@@ -9483,13 +9441,6 @@
   <p:clrMapOvr>
     <a:masterClrMapping/>
   </p:clrMapOvr>
-  <p:timing>
-    <p:tnLst>
-      <p:par>
-        <p:cTn id="1" dur="indefinite" restart="never" nodeType="tmRoot"/>
-      </p:par>
-    </p:tnLst>
-  </p:timing>
 </p:sld>
 </file>
 
@@ -11850,13 +11801,13 @@
               <a:buNone/>
             </a:pPr>
             <a:r>
-              <a:rPr lang="en-US" altLang="en-US" sz="2177" b="1">
+              <a:rPr lang="en-US" altLang="en-US" sz="2177" b="1" dirty="0">
                 <a:latin typeface="Courier New" panose="02070309020205020404" pitchFamily="49" charset="0"/>
               </a:rPr>
               <a:t>&gt;&gt;&gt;</a:t>
             </a:r>
             <a:r>
-              <a:rPr lang="en-US" altLang="en-US" sz="2177">
+              <a:rPr lang="en-US" altLang="en-US" sz="2177" dirty="0">
                 <a:latin typeface="Courier New" panose="02070309020205020404" pitchFamily="49" charset="0"/>
               </a:rPr>
               <a:t> birthdays['Turing'] = 1912</a:t>
@@ -11875,13 +11826,13 @@
               <a:buNone/>
             </a:pPr>
             <a:r>
-              <a:rPr lang="en-US" altLang="en-US" sz="2177" b="1">
+              <a:rPr lang="en-US" altLang="en-US" sz="2177" b="1" dirty="0">
                 <a:latin typeface="Courier New" panose="02070309020205020404" pitchFamily="49" charset="0"/>
               </a:rPr>
               <a:t>&gt;&gt;&gt; print</a:t>
             </a:r>
             <a:r>
-              <a:rPr lang="en-US" altLang="en-US" sz="2177">
+              <a:rPr lang="en-US" altLang="en-US" sz="2177" dirty="0">
                 <a:latin typeface="Courier New" panose="02070309020205020404" pitchFamily="49" charset="0"/>
               </a:rPr>
               <a:t>(birthdays)</a:t>
@@ -11900,13 +11851,13 @@
               <a:buNone/>
             </a:pPr>
             <a:r>
-              <a:rPr lang="en-US" altLang="en-US" sz="2177" i="1">
+              <a:rPr lang="en-US" altLang="en-US" sz="2177" i="1" dirty="0">
                 <a:solidFill>
                   <a:srgbClr val="006600"/>
                 </a:solidFill>
                 <a:latin typeface="Courier New" panose="02070309020205020404" pitchFamily="49" charset="0"/>
               </a:rPr>
-              <a:t>{'Turing' : 1912, 'Newton' : 1642, 'Darwin' : 1809}</a:t>
+              <a:t>{'Newton' : 1642, 'Darwin' : 1809, 'Turing’ : 1912}</a:t>
             </a:r>
           </a:p>
         </p:txBody>
@@ -15631,17 +15582,8 @@
               <a:rPr lang="en-US" altLang="en-US" sz="2540" dirty="0">
                 <a:latin typeface="Calibri" panose="020F0502020204030204" pitchFamily="34" charset="0"/>
               </a:rPr>
-              <a:t>Useful methods on </a:t>
-            </a:r>
-            <a:r>
-              <a:rPr lang="en-US" altLang="en-US" sz="2540" dirty="0" smtClean="0">
-                <a:latin typeface="Calibri" panose="020F0502020204030204" pitchFamily="34" charset="0"/>
-              </a:rPr>
-              <a:t>dictionaries (continued): </a:t>
-            </a:r>
-            <a:endParaRPr lang="en-US" altLang="en-US" sz="2540" dirty="0">
-              <a:latin typeface="Calibri" panose="020F0502020204030204" pitchFamily="34" charset="0"/>
-            </a:endParaRPr>
+              <a:t>Useful methods on dictionaries (continued): </a:t>
+            </a:r>
           </a:p>
           <a:p>
             <a:pPr eaLnBrk="1">
@@ -15891,12 +15833,6 @@
                 <a:cs typeface="DejaVu Sans" pitchFamily="34" charset="0"/>
               </a:rPr>
               <a:t>The same element can only appear once.</a:t>
-            </a:r>
-            <a:r>
-              <a:rPr lang="en-GB" altLang="en-US" sz="2600">
-                <a:cs typeface="DejaVu Sans" pitchFamily="34" charset="0"/>
-              </a:rPr>
-              <a:t/>
             </a:r>
             <a:br>
               <a:rPr lang="en-GB" altLang="en-US" sz="2600">
@@ -16358,13 +16294,6 @@
     <a:masterClrMapping/>
   </p:clrMapOvr>
   <p:transition spd="slow"/>
-  <p:timing>
-    <p:tnLst>
-      <p:par>
-        <p:cTn id="1" dur="indefinite" restart="never" nodeType="tmRoot"/>
-      </p:par>
-    </p:tnLst>
-  </p:timing>
 </p:sld>
 </file>
 
@@ -17761,13 +17690,6 @@
   <p:clrMapOvr>
     <a:masterClrMapping/>
   </p:clrMapOvr>
-  <p:timing>
-    <p:tnLst>
-      <p:par>
-        <p:cTn id="1" dur="indefinite" restart="never" nodeType="tmRoot"/>
-      </p:par>
-    </p:tnLst>
-  </p:timing>
 </p:sld>
 </file>
 
@@ -18033,13 +17955,6 @@
     <a:masterClrMapping/>
   </p:clrMapOvr>
   <p:transition spd="slow"/>
-  <p:timing>
-    <p:tnLst>
-      <p:par>
-        <p:cTn id="1" dur="indefinite" restart="never" nodeType="tmRoot"/>
-      </p:par>
-    </p:tnLst>
-  </p:timing>
 </p:sld>
 </file>
 
@@ -18291,13 +18206,6 @@
               </a:rPr>
               <a:t>needs 1 thing to loop over</a:t>
             </a:r>
-            <a:r>
-              <a:rPr lang="en-GB" i="1" dirty="0">
-                <a:latin typeface="Liberation Sans" pitchFamily="18"/>
-                <a:cs typeface="DejaVu Sans" pitchFamily="2"/>
-              </a:rPr>
-              <a:t/>
-            </a:r>
             <a:br>
               <a:rPr lang="en-GB" i="1" dirty="0">
                 <a:latin typeface="Liberation Sans" pitchFamily="18"/>
@@ -18380,13 +18288,6 @@
     <a:masterClrMapping/>
   </p:clrMapOvr>
   <p:transition spd="slow"/>
-  <p:timing>
-    <p:tnLst>
-      <p:par>
-        <p:cTn id="1" dur="indefinite" restart="never" nodeType="tmRoot"/>
-      </p:par>
-    </p:tnLst>
-  </p:timing>
 </p:sld>
 </file>
 
@@ -18632,13 +18533,6 @@
                 <a:cs typeface="Courier New" panose="02070309020205020404" pitchFamily="49" charset="0"/>
               </a:rPr>
             </a:br>
-            <a:r>
-              <a:rPr lang="en-GB" altLang="en-US" sz="2400" dirty="0">
-                <a:latin typeface="Courier New" panose="02070309020205020404" pitchFamily="49" charset="0"/>
-                <a:cs typeface="Courier New" panose="02070309020205020404" pitchFamily="49" charset="0"/>
-              </a:rPr>
-              <a:t/>
-            </a:r>
             <a:br>
               <a:rPr lang="en-GB" altLang="en-US" sz="2400" dirty="0">
                 <a:latin typeface="Courier New" panose="02070309020205020404" pitchFamily="49" charset="0"/>
@@ -18688,13 +18582,6 @@
     <a:masterClrMapping/>
   </p:clrMapOvr>
   <p:transition spd="slow"/>
-  <p:timing>
-    <p:tnLst>
-      <p:par>
-        <p:cTn id="1" dur="indefinite" restart="never" nodeType="tmRoot"/>
-      </p:par>
-    </p:tnLst>
-  </p:timing>
 </p:sld>
 </file>
 
@@ -18988,13 +18875,6 @@
     <a:masterClrMapping/>
   </p:clrMapOvr>
   <p:transition spd="slow"/>
-  <p:timing>
-    <p:tnLst>
-      <p:par>
-        <p:cTn id="1" dur="indefinite" restart="never" nodeType="tmRoot"/>
-      </p:par>
-    </p:tnLst>
-  </p:timing>
 </p:sld>
 </file>
 
@@ -19422,13 +19302,6 @@
     <a:masterClrMapping/>
   </p:clrMapOvr>
   <p:transition spd="slow"/>
-  <p:timing>
-    <p:tnLst>
-      <p:par>
-        <p:cTn id="1" dur="indefinite" restart="never" nodeType="tmRoot"/>
-      </p:par>
-    </p:tnLst>
-  </p:timing>
 </p:sld>
 </file>
 
@@ -19609,13 +19482,6 @@
               <a:buNone/>
               <a:defRPr/>
             </a:pPr>
-            <a:r>
-              <a:rPr lang="en-GB" dirty="0">
-                <a:latin typeface="Courier New" panose="02070309020205020404" pitchFamily="49" charset="0"/>
-                <a:cs typeface="Courier New" panose="02070309020205020404" pitchFamily="49" charset="0"/>
-              </a:rPr>
-              <a:t/>
-            </a:r>
             <a:br>
               <a:rPr lang="en-GB" dirty="0">
                 <a:latin typeface="Courier New" panose="02070309020205020404" pitchFamily="49" charset="0"/>
@@ -19680,13 +19546,6 @@
     <a:masterClrMapping/>
   </p:clrMapOvr>
   <p:transition spd="slow"/>
-  <p:timing>
-    <p:tnLst>
-      <p:par>
-        <p:cTn id="1" dur="indefinite" restart="never" nodeType="tmRoot"/>
-      </p:par>
-    </p:tnLst>
-  </p:timing>
 </p:sld>
 </file>
 

</xml_diff>

<commit_message>
Changes to sets/dicts as discussed (Alan/Dan 16/02)
</commit_message>
<xml_diff>
--- a/python-intro/slides/11_ceda-sets__dicts.pptx
+++ b/python-intro/slides/11_ceda-sets__dicts.pptx
@@ -10843,7 +10843,7 @@
         <p:spPr bwMode="auto">
           <a:xfrm>
             <a:off x="496801" y="4174921"/>
-            <a:ext cx="5564600" cy="618054"/>
+            <a:ext cx="5624873" cy="1204369"/>
           </a:xfrm>
           <a:prstGeom prst="rect">
             <a:avLst/>
@@ -10999,7 +10999,26 @@
               <a:rPr lang="en-US" altLang="en-US" sz="2540" dirty="0">
                 <a:latin typeface="Calibri" panose="020F0502020204030204" pitchFamily="34" charset="0"/>
               </a:rPr>
-              <a:t>Just like using a phonebook or dictionary</a:t>
+              <a:t>Just like using a phonebook or dictionary.</a:t>
+            </a:r>
+          </a:p>
+          <a:p>
+            <a:pPr eaLnBrk="1">
+              <a:lnSpc>
+                <a:spcPct val="150000"/>
+              </a:lnSpc>
+              <a:buClr>
+                <a:srgbClr val="000000"/>
+              </a:buClr>
+              <a:buSzPct val="100000"/>
+              <a:buFont typeface="Times New Roman" panose="02020603050405020304" pitchFamily="18" charset="0"/>
+              <a:buNone/>
+            </a:pPr>
+            <a:r>
+              <a:rPr lang="en-US" altLang="en-US" sz="2540" dirty="0">
+                <a:latin typeface="Calibri" panose="020F0502020204030204" pitchFamily="34" charset="0"/>
+              </a:rPr>
+              <a:t>Create an empty dictionary using {}</a:t>
             </a:r>
           </a:p>
         </p:txBody>
@@ -13937,7 +13956,7 @@
         </p:nvSpPr>
         <p:spPr bwMode="auto">
           <a:xfrm>
-            <a:off x="577441" y="1600201"/>
+            <a:off x="787113" y="1412776"/>
             <a:ext cx="7860960" cy="4651200"/>
           </a:xfrm>
           <a:prstGeom prst="rect">
@@ -14385,6 +14404,22 @@
               <a:buFont typeface="Times New Roman" panose="02020603050405020304" pitchFamily="18" charset="0"/>
               <a:buNone/>
             </a:pPr>
+            <a:endParaRPr lang="en-US" altLang="en-US" sz="1814" dirty="0">
+              <a:latin typeface="Courier New" panose="02070309020205020404" pitchFamily="49" charset="0"/>
+            </a:endParaRPr>
+          </a:p>
+          <a:p>
+            <a:pPr eaLnBrk="1">
+              <a:lnSpc>
+                <a:spcPct val="125000"/>
+              </a:lnSpc>
+              <a:buClr>
+                <a:srgbClr val="000000"/>
+              </a:buClr>
+              <a:buSzPct val="100000"/>
+              <a:buFont typeface="Times New Roman" panose="02020603050405020304" pitchFamily="18" charset="0"/>
+              <a:buNone/>
+            </a:pPr>
             <a:r>
               <a:rPr lang="en-US" altLang="en-US" sz="1814" b="1" dirty="0">
                 <a:latin typeface="Courier New" panose="02070309020205020404" pitchFamily="49" charset="0"/>
@@ -14519,8 +14554,8 @@
         </p:nvSpPr>
         <p:spPr bwMode="auto">
           <a:xfrm>
-            <a:off x="495360" y="345961"/>
-            <a:ext cx="7954422" cy="1232645"/>
+            <a:off x="267424" y="332656"/>
+            <a:ext cx="4304576" cy="1175386"/>
           </a:xfrm>
           <a:prstGeom prst="rect">
             <a:avLst/>
@@ -14698,52 +14733,65 @@
               <a:t> </a:t>
             </a:r>
             <a:r>
-              <a:rPr lang="en-US" altLang="en-US" dirty="0">
+              <a:rPr lang="en-US" altLang="en-US" b="1" dirty="0">
                 <a:latin typeface="Courier New" panose="02070309020205020404" pitchFamily="49" charset="0"/>
                 <a:cs typeface="Courier New" panose="02070309020205020404" pitchFamily="49" charset="0"/>
               </a:rPr>
-              <a:t>.keys()</a:t>
-            </a:r>
-            <a:r>
-              <a:rPr lang="en-US" altLang="en-US" dirty="0">
-                <a:cs typeface="Courier New" panose="02070309020205020404" pitchFamily="49" charset="0"/>
-              </a:rPr>
-              <a:t>, </a:t>
-            </a:r>
-            <a:r>
-              <a:rPr lang="en-US" altLang="en-US" dirty="0">
+              <a:t>.keys() and .values()</a:t>
+            </a:r>
+          </a:p>
+        </p:txBody>
+      </p:sp>
+      <p:sp>
+        <p:nvSpPr>
+          <p:cNvPr id="2" name="TextBox 1">
+            <a:extLst>
+              <a:ext uri="{FF2B5EF4-FFF2-40B4-BE49-F238E27FC236}">
+                <a16:creationId xmlns:a16="http://schemas.microsoft.com/office/drawing/2014/main" id="{4D8D5825-BFBD-809C-24DF-A320E294F9EB}"/>
+              </a:ext>
+            </a:extLst>
+          </p:cNvPr>
+          <p:cNvSpPr txBox="1"/>
+          <p:nvPr/>
+        </p:nvSpPr>
+        <p:spPr>
+          <a:xfrm>
+            <a:off x="261205" y="3429000"/>
+            <a:ext cx="4310795" cy="369332"/>
+          </a:xfrm>
+          <a:prstGeom prst="rect">
+            <a:avLst/>
+          </a:prstGeom>
+          <a:noFill/>
+        </p:spPr>
+        <p:txBody>
+          <a:bodyPr wrap="none" rtlCol="0">
+            <a:spAutoFit/>
+          </a:bodyPr>
+          <a:lstStyle/>
+          <a:p>
+            <a:r>
+              <a:rPr lang="en-US" altLang="en-US" b="1" dirty="0">
                 <a:latin typeface="Courier New" panose="02070309020205020404" pitchFamily="49" charset="0"/>
                 <a:cs typeface="Courier New" panose="02070309020205020404" pitchFamily="49" charset="0"/>
               </a:rPr>
-              <a:t>.values(),.</a:t>
-            </a:r>
-            <a:r>
-              <a:rPr lang="en-US" altLang="en-US" dirty="0" err="1">
+              <a:t>.</a:t>
+            </a:r>
+            <a:r>
+              <a:rPr lang="en-US" altLang="en-US" b="1" dirty="0" err="1">
                 <a:latin typeface="Courier New" panose="02070309020205020404" pitchFamily="49" charset="0"/>
                 <a:cs typeface="Courier New" panose="02070309020205020404" pitchFamily="49" charset="0"/>
               </a:rPr>
               <a:t>setdefault</a:t>
             </a:r>
             <a:r>
-              <a:rPr lang="en-US" altLang="en-US" dirty="0">
+              <a:rPr lang="en-US" altLang="en-US" b="1" dirty="0">
                 <a:latin typeface="Courier New" panose="02070309020205020404" pitchFamily="49" charset="0"/>
                 <a:cs typeface="Courier New" panose="02070309020205020404" pitchFamily="49" charset="0"/>
               </a:rPr>
               <a:t>(&lt;key&gt;, &lt;default&gt;)</a:t>
             </a:r>
-            <a:r>
-              <a:rPr lang="en-US" altLang="en-US" dirty="0">
-                <a:cs typeface="Courier New" panose="02070309020205020404" pitchFamily="49" charset="0"/>
-              </a:rPr>
-              <a:t>, </a:t>
-            </a:r>
-            <a:r>
-              <a:rPr lang="en-US" altLang="en-US" dirty="0">
-                <a:latin typeface="Courier New" panose="02070309020205020404" pitchFamily="49" charset="0"/>
-                <a:cs typeface="Courier New" panose="02070309020205020404" pitchFamily="49" charset="0"/>
-              </a:rPr>
-              <a:t>.items()</a:t>
-            </a:r>
+            <a:endParaRPr lang="en-GB" dirty="0"/>
           </a:p>
         </p:txBody>
       </p:sp>
@@ -15599,25 +15647,28 @@
               <a:t>	</a:t>
             </a:r>
             <a:r>
-              <a:rPr lang="en-US" altLang="en-US" sz="2400" dirty="0">
+              <a:rPr lang="en-US" altLang="en-US" b="1" dirty="0">
                 <a:latin typeface="Courier New" panose="02070309020205020404" pitchFamily="49" charset="0"/>
                 <a:cs typeface="Courier New" panose="02070309020205020404" pitchFamily="49" charset="0"/>
               </a:rPr>
               <a:t>.items()</a:t>
             </a:r>
             <a:r>
-              <a:rPr lang="en-US" altLang="en-US" sz="2400" dirty="0">
+              <a:rPr lang="en-US" altLang="en-US" b="1" dirty="0">
                 <a:latin typeface="+mn-lt"/>
                 <a:cs typeface="Courier New" panose="02070309020205020404" pitchFamily="49" charset="0"/>
               </a:rPr>
               <a:t> </a:t>
             </a:r>
             <a:r>
-              <a:rPr lang="en-US" altLang="en-US" sz="2400" dirty="0">
+              <a:rPr lang="en-US" altLang="en-US" dirty="0">
                 <a:latin typeface="Calibri" panose="020F0502020204030204" pitchFamily="34" charset="0"/>
               </a:rPr>
               <a:t>returns a sequence of tuples: </a:t>
             </a:r>
+            <a:endParaRPr lang="en-US" altLang="en-US" sz="2400" dirty="0">
+              <a:latin typeface="Calibri" panose="020F0502020204030204" pitchFamily="34" charset="0"/>
+            </a:endParaRPr>
           </a:p>
           <a:p>
             <a:pPr eaLnBrk="1">

</xml_diff>